<commit_message>
Final touches in slides
</commit_message>
<xml_diff>
--- a/photos/project1.pptx
+++ b/photos/project1.pptx
@@ -3766,7 +3766,7 @@
         </p:nvSpPr>
         <p:spPr>
           <a:xfrm>
-            <a:off x="4141325" y="4962599"/>
+            <a:off x="4031828" y="4972512"/>
             <a:ext cx="1670586" cy="646331"/>
           </a:xfrm>
           <a:prstGeom prst="rect">
@@ -3812,7 +3812,7 @@
         </p:nvSpPr>
         <p:spPr>
           <a:xfrm>
-            <a:off x="4159164" y="3906944"/>
+            <a:off x="4076833" y="3920730"/>
             <a:ext cx="864980" cy="369332"/>
           </a:xfrm>
           <a:prstGeom prst="rect">
@@ -3851,7 +3851,7 @@
         </p:nvSpPr>
         <p:spPr>
           <a:xfrm>
-            <a:off x="4267204" y="2838450"/>
+            <a:off x="4076833" y="2848896"/>
             <a:ext cx="771945" cy="380584"/>
           </a:xfrm>
           <a:prstGeom prst="rect">
@@ -3960,7 +3960,7 @@
         <p:spPr>
           <a:xfrm>
             <a:off x="4031977" y="6077634"/>
-            <a:ext cx="835293" cy="369332"/>
+            <a:ext cx="1802416" cy="369332"/>
           </a:xfrm>
           <a:prstGeom prst="rect">
             <a:avLst/>
@@ -3979,7 +3979,7 @@
                   <a:srgbClr val="002060"/>
                 </a:solidFill>
               </a:rPr>
-              <a:t>Report</a:t>
+              <a:t>Report/webpage</a:t>
             </a:r>
           </a:p>
         </p:txBody>
@@ -4384,7 +4384,7 @@
         </p:blipFill>
         <p:spPr>
           <a:xfrm>
-            <a:off x="5080522" y="5627300"/>
+            <a:off x="6327897" y="5618843"/>
             <a:ext cx="1270000" cy="1270000"/>
           </a:xfrm>
           <a:prstGeom prst="rect">

</xml_diff>